<commit_message>
roteiro cerimonial seminário NID ppts 02122023
</commit_message>
<xml_diff>
--- a/09 seminário NID/Eduardo_PPT Seminário NID Yduqs Wyden UniRuy 2023_2 Dudu.pptx
+++ b/09 seminário NID/Eduardo_PPT Seminário NID Yduqs Wyden UniRuy 2023_2 Dudu.pptx
@@ -3957,7 +3957,7 @@
           </a:ln>
           <a:extLst>
             <a:ext uri="{C572A759-6A51-4108-AA02-DFA0A04FC94B}">
-              <ma14:wrappingTextBoxFlag xmlns="" xmlns:ma14="http://schemas.microsoft.com/office/mac/drawingml/2011/main" val="1"/>
+              <ma14:wrappingTextBoxFlag xmlns:ma14="http://schemas.microsoft.com/office/mac/drawingml/2011/main" xmlns="" val="1"/>
             </a:ext>
           </a:extLst>
         </p:spPr>
@@ -4006,7 +4006,7 @@
           </a:ln>
           <a:extLst>
             <a:ext uri="{C572A759-6A51-4108-AA02-DFA0A04FC94B}">
-              <ma14:wrappingTextBoxFlag xmlns="" xmlns:ma14="http://schemas.microsoft.com/office/mac/drawingml/2011/main" val="1"/>
+              <ma14:wrappingTextBoxFlag xmlns:ma14="http://schemas.microsoft.com/office/mac/drawingml/2011/main" xmlns="" val="1"/>
             </a:ext>
           </a:extLst>
         </p:spPr>
@@ -4977,13 +4977,13 @@
           </a:ln>
           <a:extLst>
             <a:ext uri="{C572A759-6A51-4108-AA02-DFA0A04FC94B}">
-              <ma14:wrappingTextBoxFlag xmlns="" xmlns:ma14="http://schemas.microsoft.com/office/mac/drawingml/2011/main" val="1"/>
+              <ma14:wrappingTextBoxFlag xmlns:ma14="http://schemas.microsoft.com/office/mac/drawingml/2011/main" xmlns="" val="1"/>
             </a:ext>
           </a:extLst>
         </p:spPr>
         <p:txBody>
           <a:bodyPr lIns="45719" rIns="45719" anchor="ctr">
-            <a:normAutofit fontScale="47500" lnSpcReduction="20000"/>
+            <a:normAutofit fontScale="40000" lnSpcReduction="20000"/>
           </a:bodyPr>
           <a:lstStyle>
             <a:lvl1pPr marL="0" marR="0" indent="0" algn="ctr" defTabSz="457200" rtl="0" latinLnBrk="0">
@@ -5311,7 +5311,23 @@
                   <a:schemeClr val="bg1"/>
                 </a:solidFill>
               </a:rPr>
-              <a:t>Formação Continuada em Tecnologias Digitais (Tópicos em Informática)</a:t>
+              <a:t>Formação </a:t>
+            </a:r>
+            <a:r>
+              <a:rPr lang="pt-BR" sz="4000" b="1">
+                <a:solidFill>
+                  <a:schemeClr val="bg1"/>
+                </a:solidFill>
+              </a:rPr>
+              <a:t>Continuada no Uso de </a:t>
+            </a:r>
+            <a:r>
+              <a:rPr lang="pt-BR" sz="4000" b="1" dirty="0">
+                <a:solidFill>
+                  <a:schemeClr val="bg1"/>
+                </a:solidFill>
+              </a:rPr>
+              <a:t>Tecnologias Digitais (Tópicos em Informática)</a:t>
             </a:r>
           </a:p>
         </p:txBody>
@@ -5343,7 +5359,7 @@
           </a:ln>
           <a:extLst>
             <a:ext uri="{C572A759-6A51-4108-AA02-DFA0A04FC94B}">
-              <ma14:wrappingTextBoxFlag xmlns="" xmlns:ma14="http://schemas.microsoft.com/office/mac/drawingml/2011/main" val="1"/>
+              <ma14:wrappingTextBoxFlag xmlns:ma14="http://schemas.microsoft.com/office/mac/drawingml/2011/main" xmlns="" val="1"/>
             </a:ext>
           </a:extLst>
         </p:spPr>
@@ -5696,7 +5712,7 @@
           </a:ln>
           <a:extLst>
             <a:ext uri="{C572A759-6A51-4108-AA02-DFA0A04FC94B}">
-              <ma14:wrappingTextBoxFlag xmlns="" xmlns:ma14="http://schemas.microsoft.com/office/mac/drawingml/2011/main" val="1"/>
+              <ma14:wrappingTextBoxFlag xmlns:ma14="http://schemas.microsoft.com/office/mac/drawingml/2011/main" xmlns="" val="1"/>
             </a:ext>
           </a:extLst>
         </p:spPr>
@@ -7710,7 +7726,7 @@
           </a:ln>
           <a:extLst>
             <a:ext uri="{C572A759-6A51-4108-AA02-DFA0A04FC94B}">
-              <ma14:wrappingTextBoxFlag xmlns="" xmlns:ma14="http://schemas.microsoft.com/office/mac/drawingml/2011/main" val="1"/>
+              <ma14:wrappingTextBoxFlag xmlns:ma14="http://schemas.microsoft.com/office/mac/drawingml/2011/main" xmlns="" val="1"/>
             </a:ext>
           </a:extLst>
         </p:spPr>
@@ -10288,6 +10304,21 @@
 </file>
 
 <file path=customXml/item1.xml><?xml version="1.0" encoding="utf-8"?>
+<p:properties xmlns:p="http://schemas.microsoft.com/office/2006/metadata/properties" xmlns:xsi="http://www.w3.org/2001/XMLSchema-instance" xmlns:pc="http://schemas.microsoft.com/office/infopath/2007/PartnerControls">
+  <documentManagement/>
+</p:properties>
+</file>
+
+<file path=customXml/item2.xml><?xml version="1.0" encoding="utf-8"?>
+<?mso-contentType ?>
+<FormTemplates xmlns="http://schemas.microsoft.com/sharepoint/v3/contenttype/forms">
+  <Display>DocumentLibraryForm</Display>
+  <Edit>DocumentLibraryForm</Edit>
+  <New>DocumentLibraryForm</New>
+</FormTemplates>
+</file>
+
+<file path=customXml/item3.xml><?xml version="1.0" encoding="utf-8"?>
 <ct:contentTypeSchema xmlns:ct="http://schemas.microsoft.com/office/2006/metadata/contentType" xmlns:ma="http://schemas.microsoft.com/office/2006/metadata/properties/metaAttributes" ct:_="" ma:_="" ma:contentTypeName="Documento" ma:contentTypeID="0x010100E7E326A6FBD7C948AAF887265A2DB080" ma:contentTypeVersion="13" ma:contentTypeDescription="Crie um novo documento." ma:contentTypeScope="" ma:versionID="5629727caf6964b78819cfb788ada473">
   <xsd:schema xmlns:xsd="http://www.w3.org/2001/XMLSchema" xmlns:xs="http://www.w3.org/2001/XMLSchema" xmlns:p="http://schemas.microsoft.com/office/2006/metadata/properties" xmlns:ns2="bab2302b-9cf7-40b9-b316-803bc24ea342" xmlns:ns3="c298cbf6-df3b-44f4-88ee-2b3d9158f680" targetNamespace="http://schemas.microsoft.com/office/2006/metadata/properties" ma:root="true" ma:fieldsID="929990cc5bdd3bebd2af3f9d94cdeeec" ns2:_="" ns3:_="">
     <xsd:import namespace="bab2302b-9cf7-40b9-b316-803bc24ea342"/>
@@ -10510,22 +10541,24 @@
 </ct:contentTypeSchema>
 </file>
 
-<file path=customXml/item2.xml><?xml version="1.0" encoding="utf-8"?>
-<?mso-contentType ?>
-<FormTemplates xmlns="http://schemas.microsoft.com/sharepoint/v3/contenttype/forms">
-  <Display>DocumentLibraryForm</Display>
-  <Edit>DocumentLibraryForm</Edit>
-  <New>DocumentLibraryForm</New>
-</FormTemplates>
+<file path=customXml/itemProps1.xml><?xml version="1.0" encoding="utf-8"?>
+<ds:datastoreItem xmlns:ds="http://schemas.openxmlformats.org/officeDocument/2006/customXml" ds:itemID="{961A30F4-F1EA-4F98-A164-76D337EE5565}">
+  <ds:schemaRefs>
+    <ds:schemaRef ds:uri="http://schemas.microsoft.com/office/2006/metadata/properties"/>
+    <ds:schemaRef ds:uri="http://schemas.microsoft.com/office/infopath/2007/PartnerControls"/>
+  </ds:schemaRefs>
+</ds:datastoreItem>
 </file>
 
-<file path=customXml/item3.xml><?xml version="1.0" encoding="utf-8"?>
-<p:properties xmlns:p="http://schemas.microsoft.com/office/2006/metadata/properties" xmlns:xsi="http://www.w3.org/2001/XMLSchema-instance" xmlns:pc="http://schemas.microsoft.com/office/infopath/2007/PartnerControls">
-  <documentManagement/>
-</p:properties>
+<file path=customXml/itemProps2.xml><?xml version="1.0" encoding="utf-8"?>
+<ds:datastoreItem xmlns:ds="http://schemas.openxmlformats.org/officeDocument/2006/customXml" ds:itemID="{AED456AD-07D2-43E3-AD57-2C9049066662}">
+  <ds:schemaRefs>
+    <ds:schemaRef ds:uri="http://schemas.microsoft.com/sharepoint/v3/contenttype/forms"/>
+  </ds:schemaRefs>
+</ds:datastoreItem>
 </file>
 
-<file path=customXml/itemProps1.xml><?xml version="1.0" encoding="utf-8"?>
+<file path=customXml/itemProps3.xml><?xml version="1.0" encoding="utf-8"?>
 <ds:datastoreItem xmlns:ds="http://schemas.openxmlformats.org/officeDocument/2006/customXml" ds:itemID="{6A7BB859-CC6B-497C-9B96-0A0D80ADCD36}">
   <ds:schemaRefs>
     <ds:schemaRef ds:uri="http://schemas.microsoft.com/office/2006/metadata/contentType"/>
@@ -10542,21 +10575,4 @@
     <ds:schemaRef ds:uri="http://schemas.microsoft.com/internal/obd"/>
   </ds:schemaRefs>
 </ds:datastoreItem>
-</file>
-
-<file path=customXml/itemProps2.xml><?xml version="1.0" encoding="utf-8"?>
-<ds:datastoreItem xmlns:ds="http://schemas.openxmlformats.org/officeDocument/2006/customXml" ds:itemID="{AED456AD-07D2-43E3-AD57-2C9049066662}">
-  <ds:schemaRefs>
-    <ds:schemaRef ds:uri="http://schemas.microsoft.com/sharepoint/v3/contenttype/forms"/>
-  </ds:schemaRefs>
-</ds:datastoreItem>
-</file>
-
-<file path=customXml/itemProps3.xml><?xml version="1.0" encoding="utf-8"?>
-<ds:datastoreItem xmlns:ds="http://schemas.openxmlformats.org/officeDocument/2006/customXml" ds:itemID="{961A30F4-F1EA-4F98-A164-76D337EE5565}">
-  <ds:schemaRefs>
-    <ds:schemaRef ds:uri="http://schemas.microsoft.com/office/2006/metadata/properties"/>
-    <ds:schemaRef ds:uri="http://schemas.microsoft.com/office/infopath/2007/PartnerControls"/>
-  </ds:schemaRefs>
-</ds:datastoreItem>
 </file>
</xml_diff>